<commit_message>
Fix Create Function Slide
</commit_message>
<xml_diff>
--- a/7. Form & CRUD/Laravel Form & CRUD.pptx
+++ b/7. Form & CRUD/Laravel Form & CRUD.pptx
@@ -5,7 +5,7 @@
     <p:sldMasterId id="2147483660" r:id="rId1"/>
   </p:sldMasterIdLst>
   <p:notesMasterIdLst>
-    <p:notesMasterId r:id="rId25"/>
+    <p:notesMasterId r:id="rId26"/>
   </p:notesMasterIdLst>
   <p:sldIdLst>
     <p:sldId id="277" r:id="rId2"/>
@@ -21,16 +21,17 @@
     <p:sldId id="294" r:id="rId12"/>
     <p:sldId id="317" r:id="rId13"/>
     <p:sldId id="295" r:id="rId14"/>
-    <p:sldId id="355" r:id="rId15"/>
-    <p:sldId id="356" r:id="rId16"/>
-    <p:sldId id="357" r:id="rId17"/>
-    <p:sldId id="358" r:id="rId18"/>
-    <p:sldId id="359" r:id="rId19"/>
-    <p:sldId id="360" r:id="rId20"/>
-    <p:sldId id="298" r:id="rId21"/>
-    <p:sldId id="299" r:id="rId22"/>
-    <p:sldId id="297" r:id="rId23"/>
-    <p:sldId id="279" r:id="rId24"/>
+    <p:sldId id="361" r:id="rId15"/>
+    <p:sldId id="355" r:id="rId16"/>
+    <p:sldId id="356" r:id="rId17"/>
+    <p:sldId id="357" r:id="rId18"/>
+    <p:sldId id="358" r:id="rId19"/>
+    <p:sldId id="359" r:id="rId20"/>
+    <p:sldId id="360" r:id="rId21"/>
+    <p:sldId id="298" r:id="rId22"/>
+    <p:sldId id="299" r:id="rId23"/>
+    <p:sldId id="297" r:id="rId24"/>
+    <p:sldId id="279" r:id="rId25"/>
   </p:sldIdLst>
   <p:sldSz cx="9144000" cy="6858000" type="screen4x3"/>
   <p:notesSz cx="6858000" cy="9144000"/>
@@ -5223,7 +5224,7 @@
           <a:p>
             <a:r>
               <a:rPr lang="en-US" dirty="0"/>
-              <a:t>Store Function</a:t>
+              <a:t>Create Function</a:t>
             </a:r>
           </a:p>
         </p:txBody>
@@ -5247,13 +5248,13 @@
         <p:spPr/>
         <p:txBody>
           <a:bodyPr>
-            <a:normAutofit fontScale="92500" lnSpcReduction="20000"/>
+            <a:normAutofit/>
           </a:bodyPr>
           <a:lstStyle/>
           <a:p>
             <a:r>
               <a:rPr lang="en-MY" dirty="0"/>
-              <a:t>Edit the store function in </a:t>
+              <a:t>Edit the create function in </a:t>
             </a:r>
             <a:r>
               <a:rPr lang="en-MY" b="1" dirty="0" err="1"/>
@@ -5280,7 +5281,7 @@
                 <a:latin typeface="Courier New" panose="02070309020205020404" pitchFamily="49" charset="0"/>
                 <a:cs typeface="Courier New" panose="02070309020205020404" pitchFamily="49" charset="0"/>
               </a:rPr>
-              <a:t>public function store(Request $request)</a:t>
+              <a:t>public function create()</a:t>
             </a:r>
           </a:p>
           <a:p>
@@ -5304,139 +5305,14 @@
                 <a:latin typeface="Courier New" panose="02070309020205020404" pitchFamily="49" charset="0"/>
                 <a:cs typeface="Courier New" panose="02070309020205020404" pitchFamily="49" charset="0"/>
               </a:rPr>
-              <a:t>	$</a:t>
-            </a:r>
-            <a:r>
-              <a:rPr lang="en-MY" sz="2200" b="1" dirty="0" err="1">
-                <a:latin typeface="Courier New" panose="02070309020205020404" pitchFamily="49" charset="0"/>
-                <a:cs typeface="Courier New" panose="02070309020205020404" pitchFamily="49" charset="0"/>
-              </a:rPr>
-              <a:t>validatedData</a:t>
-            </a:r>
-            <a:r>
-              <a:rPr lang="en-MY" sz="2200" b="1" dirty="0">
-                <a:latin typeface="Courier New" panose="02070309020205020404" pitchFamily="49" charset="0"/>
-                <a:cs typeface="Courier New" panose="02070309020205020404" pitchFamily="49" charset="0"/>
-              </a:rPr>
-              <a:t> = $request-&gt;validate([</a:t>
-            </a:r>
-          </a:p>
-          <a:p>
-            <a:pPr marL="118872" indent="0">
-              <a:buNone/>
-            </a:pPr>
-            <a:r>
-              <a:rPr lang="en-MY" sz="2200" b="1" dirty="0">
-                <a:latin typeface="Courier New" panose="02070309020205020404" pitchFamily="49" charset="0"/>
-                <a:cs typeface="Courier New" panose="02070309020205020404" pitchFamily="49" charset="0"/>
-              </a:rPr>
-              <a:t>		‘name' =&gt; 'required|max:255’,</a:t>
-            </a:r>
-          </a:p>
-          <a:p>
-            <a:pPr marL="118872" indent="0">
-              <a:buNone/>
-            </a:pPr>
-            <a:r>
-              <a:rPr lang="en-MY" sz="2200" b="1" dirty="0">
-                <a:latin typeface="Courier New" panose="02070309020205020404" pitchFamily="49" charset="0"/>
-                <a:cs typeface="Courier New" panose="02070309020205020404" pitchFamily="49" charset="0"/>
-              </a:rPr>
-              <a:t>		'email' =&gt; 'required’,</a:t>
-            </a:r>
-          </a:p>
-          <a:p>
-            <a:pPr marL="118872" indent="0">
-              <a:buNone/>
-            </a:pPr>
-            <a:r>
-              <a:rPr lang="en-MY" sz="2200" b="1" dirty="0">
-                <a:latin typeface="Courier New" panose="02070309020205020404" pitchFamily="49" charset="0"/>
-                <a:cs typeface="Courier New" panose="02070309020205020404" pitchFamily="49" charset="0"/>
-              </a:rPr>
-              <a:t>		‘gender' =&gt; 'required’,</a:t>
-            </a:r>
-          </a:p>
-          <a:p>
-            <a:pPr marL="118872" indent="0">
-              <a:buNone/>
-            </a:pPr>
-            <a:r>
-              <a:rPr lang="en-MY" sz="2200" b="1" dirty="0">
-                <a:latin typeface="Courier New" panose="02070309020205020404" pitchFamily="49" charset="0"/>
-                <a:cs typeface="Courier New" panose="02070309020205020404" pitchFamily="49" charset="0"/>
-              </a:rPr>
-              <a:t>		'age' =&gt; '</a:t>
-            </a:r>
-            <a:r>
-              <a:rPr lang="en-MY" sz="2200" b="1" dirty="0" err="1">
-                <a:latin typeface="Courier New" panose="02070309020205020404" pitchFamily="49" charset="0"/>
-                <a:cs typeface="Courier New" panose="02070309020205020404" pitchFamily="49" charset="0"/>
-              </a:rPr>
-              <a:t>required|numeric</a:t>
-            </a:r>
-            <a:r>
-              <a:rPr lang="en-MY" sz="2200" b="1" dirty="0">
-                <a:latin typeface="Courier New" panose="02070309020205020404" pitchFamily="49" charset="0"/>
-                <a:cs typeface="Courier New" panose="02070309020205020404" pitchFamily="49" charset="0"/>
-              </a:rPr>
-              <a:t>',]);</a:t>
-            </a:r>
-          </a:p>
-          <a:p>
-            <a:pPr marL="118872" indent="0">
-              <a:buNone/>
-            </a:pPr>
-            <a:endParaRPr lang="en-MY" sz="2200" b="1" dirty="0">
-              <a:latin typeface="Courier New" panose="02070309020205020404" pitchFamily="49" charset="0"/>
-              <a:cs typeface="Courier New" panose="02070309020205020404" pitchFamily="49" charset="0"/>
-            </a:endParaRPr>
-          </a:p>
-          <a:p>
-            <a:pPr marL="118872" indent="0">
-              <a:buNone/>
-            </a:pPr>
-            <a:r>
-              <a:rPr lang="en-MY" sz="2200" b="1" dirty="0">
-                <a:latin typeface="Courier New" panose="02070309020205020404" pitchFamily="49" charset="0"/>
-                <a:cs typeface="Courier New" panose="02070309020205020404" pitchFamily="49" charset="0"/>
-              </a:rPr>
-              <a:t>	$show = Student::create($</a:t>
-            </a:r>
-            <a:r>
-              <a:rPr lang="en-MY" sz="2200" b="1" dirty="0" err="1">
-                <a:latin typeface="Courier New" panose="02070309020205020404" pitchFamily="49" charset="0"/>
-                <a:cs typeface="Courier New" panose="02070309020205020404" pitchFamily="49" charset="0"/>
-              </a:rPr>
-              <a:t>validatedData</a:t>
-            </a:r>
-            <a:r>
-              <a:rPr lang="en-MY" sz="2200" b="1" dirty="0">
-                <a:latin typeface="Courier New" panose="02070309020205020404" pitchFamily="49" charset="0"/>
-                <a:cs typeface="Courier New" panose="02070309020205020404" pitchFamily="49" charset="0"/>
-              </a:rPr>
-              <a:t>);</a:t>
-            </a:r>
-          </a:p>
-          <a:p>
-            <a:pPr marL="118872" indent="0">
-              <a:buNone/>
-            </a:pPr>
-            <a:endParaRPr lang="en-MY" sz="2200" b="1" dirty="0">
-              <a:latin typeface="Courier New" panose="02070309020205020404" pitchFamily="49" charset="0"/>
-              <a:cs typeface="Courier New" panose="02070309020205020404" pitchFamily="49" charset="0"/>
-            </a:endParaRPr>
-          </a:p>
-          <a:p>
-            <a:pPr marL="118872" indent="0">
-              <a:buNone/>
-            </a:pPr>
-            <a:r>
-              <a:rPr lang="en-MY" sz="2200" b="1" dirty="0">
-                <a:latin typeface="Courier New" panose="02070309020205020404" pitchFamily="49" charset="0"/>
-                <a:cs typeface="Courier New" panose="02070309020205020404" pitchFamily="49" charset="0"/>
-              </a:rPr>
-              <a:t>	return redirect(‘/students')-&gt;with('success’, 		'Data saved’);</a:t>
+              <a:t>	</a:t>
+            </a:r>
+            <a:r>
+              <a:rPr lang="en-MY" sz="2400" b="1" dirty="0">
+                <a:latin typeface="Courier New" panose="02070309020205020404" pitchFamily="49" charset="0"/>
+                <a:cs typeface="Courier New" panose="02070309020205020404" pitchFamily="49" charset="0"/>
+              </a:rPr>
+              <a:t> return view(‘create’);</a:t>
             </a:r>
           </a:p>
           <a:p>
@@ -5456,7 +5332,7 @@
     </p:spTree>
     <p:extLst>
       <p:ext uri="{BB962C8B-B14F-4D97-AF65-F5344CB8AC3E}">
-        <p14:creationId xmlns:p14="http://schemas.microsoft.com/office/powerpoint/2010/main" val="570503314"/>
+        <p14:creationId xmlns:p14="http://schemas.microsoft.com/office/powerpoint/2010/main" val="2700022250"/>
       </p:ext>
     </p:extLst>
   </p:cSld>
@@ -5506,7 +5382,7 @@
           <a:p>
             <a:r>
               <a:rPr lang="en-US" dirty="0"/>
-              <a:t>Show Function</a:t>
+              <a:t>Store Function</a:t>
             </a:r>
           </a:p>
         </p:txBody>
@@ -5530,13 +5406,13 @@
         <p:spPr/>
         <p:txBody>
           <a:bodyPr>
-            <a:normAutofit/>
+            <a:normAutofit fontScale="92500" lnSpcReduction="20000"/>
           </a:bodyPr>
           <a:lstStyle/>
           <a:p>
             <a:r>
               <a:rPr lang="en-MY" dirty="0"/>
-              <a:t>Edit the show function in </a:t>
+              <a:t>Edit the store function in </a:t>
             </a:r>
             <a:r>
               <a:rPr lang="en-MY" b="1" dirty="0" err="1"/>
@@ -5559,11 +5435,11 @@
               <a:buNone/>
             </a:pPr>
             <a:r>
-              <a:rPr lang="en-MY" sz="2000" b="1" dirty="0">
-                <a:latin typeface="Courier New" panose="02070309020205020404" pitchFamily="49" charset="0"/>
-                <a:cs typeface="Courier New" panose="02070309020205020404" pitchFamily="49" charset="0"/>
-              </a:rPr>
-              <a:t>public function show(Student $student)</a:t>
+              <a:rPr lang="en-MY" sz="2200" b="1" dirty="0">
+                <a:latin typeface="Courier New" panose="02070309020205020404" pitchFamily="49" charset="0"/>
+                <a:cs typeface="Courier New" panose="02070309020205020404" pitchFamily="49" charset="0"/>
+              </a:rPr>
+              <a:t>public function store(Request $request)</a:t>
             </a:r>
           </a:p>
           <a:p>
@@ -5571,7 +5447,7 @@
               <a:buNone/>
             </a:pPr>
             <a:r>
-              <a:rPr lang="en-MY" sz="2000" b="1" dirty="0">
+              <a:rPr lang="en-MY" sz="2200" b="1" dirty="0">
                 <a:latin typeface="Courier New" panose="02070309020205020404" pitchFamily="49" charset="0"/>
                 <a:cs typeface="Courier New" panose="02070309020205020404" pitchFamily="49" charset="0"/>
               </a:rPr>
@@ -5583,11 +5459,25 @@
               <a:buNone/>
             </a:pPr>
             <a:r>
-              <a:rPr lang="en-MY" sz="2000" b="1" dirty="0">
-                <a:latin typeface="Courier New" panose="02070309020205020404" pitchFamily="49" charset="0"/>
-                <a:cs typeface="Courier New" panose="02070309020205020404" pitchFamily="49" charset="0"/>
-              </a:rPr>
-              <a:t>	return view('show', compact('student'));</a:t>
+              <a:rPr lang="en-MY" sz="2200" b="1" dirty="0">
+                <a:latin typeface="Courier New" panose="02070309020205020404" pitchFamily="49" charset="0"/>
+                <a:cs typeface="Courier New" panose="02070309020205020404" pitchFamily="49" charset="0"/>
+              </a:rPr>
+              <a:t>	$</a:t>
+            </a:r>
+            <a:r>
+              <a:rPr lang="en-MY" sz="2200" b="1" dirty="0" err="1">
+                <a:latin typeface="Courier New" panose="02070309020205020404" pitchFamily="49" charset="0"/>
+                <a:cs typeface="Courier New" panose="02070309020205020404" pitchFamily="49" charset="0"/>
+              </a:rPr>
+              <a:t>validatedData</a:t>
+            </a:r>
+            <a:r>
+              <a:rPr lang="en-MY" sz="2200" b="1" dirty="0">
+                <a:latin typeface="Courier New" panose="02070309020205020404" pitchFamily="49" charset="0"/>
+                <a:cs typeface="Courier New" panose="02070309020205020404" pitchFamily="49" charset="0"/>
+              </a:rPr>
+              <a:t> = $request-&gt;validate([</a:t>
             </a:r>
           </a:p>
           <a:p>
@@ -5595,7 +5485,125 @@
               <a:buNone/>
             </a:pPr>
             <a:r>
-              <a:rPr lang="en-MY" sz="2000" b="1" dirty="0">
+              <a:rPr lang="en-MY" sz="2200" b="1" dirty="0">
+                <a:latin typeface="Courier New" panose="02070309020205020404" pitchFamily="49" charset="0"/>
+                <a:cs typeface="Courier New" panose="02070309020205020404" pitchFamily="49" charset="0"/>
+              </a:rPr>
+              <a:t>		‘name' =&gt; 'required|max:255’,</a:t>
+            </a:r>
+          </a:p>
+          <a:p>
+            <a:pPr marL="118872" indent="0">
+              <a:buNone/>
+            </a:pPr>
+            <a:r>
+              <a:rPr lang="en-MY" sz="2200" b="1" dirty="0">
+                <a:latin typeface="Courier New" panose="02070309020205020404" pitchFamily="49" charset="0"/>
+                <a:cs typeface="Courier New" panose="02070309020205020404" pitchFamily="49" charset="0"/>
+              </a:rPr>
+              <a:t>		'email' =&gt; 'required’,</a:t>
+            </a:r>
+          </a:p>
+          <a:p>
+            <a:pPr marL="118872" indent="0">
+              <a:buNone/>
+            </a:pPr>
+            <a:r>
+              <a:rPr lang="en-MY" sz="2200" b="1" dirty="0">
+                <a:latin typeface="Courier New" panose="02070309020205020404" pitchFamily="49" charset="0"/>
+                <a:cs typeface="Courier New" panose="02070309020205020404" pitchFamily="49" charset="0"/>
+              </a:rPr>
+              <a:t>		‘gender' =&gt; 'required’,</a:t>
+            </a:r>
+          </a:p>
+          <a:p>
+            <a:pPr marL="118872" indent="0">
+              <a:buNone/>
+            </a:pPr>
+            <a:r>
+              <a:rPr lang="en-MY" sz="2200" b="1" dirty="0">
+                <a:latin typeface="Courier New" panose="02070309020205020404" pitchFamily="49" charset="0"/>
+                <a:cs typeface="Courier New" panose="02070309020205020404" pitchFamily="49" charset="0"/>
+              </a:rPr>
+              <a:t>		'age' =&gt; '</a:t>
+            </a:r>
+            <a:r>
+              <a:rPr lang="en-MY" sz="2200" b="1" dirty="0" err="1">
+                <a:latin typeface="Courier New" panose="02070309020205020404" pitchFamily="49" charset="0"/>
+                <a:cs typeface="Courier New" panose="02070309020205020404" pitchFamily="49" charset="0"/>
+              </a:rPr>
+              <a:t>required|numeric</a:t>
+            </a:r>
+            <a:r>
+              <a:rPr lang="en-MY" sz="2200" b="1" dirty="0">
+                <a:latin typeface="Courier New" panose="02070309020205020404" pitchFamily="49" charset="0"/>
+                <a:cs typeface="Courier New" panose="02070309020205020404" pitchFamily="49" charset="0"/>
+              </a:rPr>
+              <a:t>',]);</a:t>
+            </a:r>
+          </a:p>
+          <a:p>
+            <a:pPr marL="118872" indent="0">
+              <a:buNone/>
+            </a:pPr>
+            <a:endParaRPr lang="en-MY" sz="2200" b="1" dirty="0">
+              <a:latin typeface="Courier New" panose="02070309020205020404" pitchFamily="49" charset="0"/>
+              <a:cs typeface="Courier New" panose="02070309020205020404" pitchFamily="49" charset="0"/>
+            </a:endParaRPr>
+          </a:p>
+          <a:p>
+            <a:pPr marL="118872" indent="0">
+              <a:buNone/>
+            </a:pPr>
+            <a:r>
+              <a:rPr lang="en-MY" sz="2200" b="1" dirty="0">
+                <a:latin typeface="Courier New" panose="02070309020205020404" pitchFamily="49" charset="0"/>
+                <a:cs typeface="Courier New" panose="02070309020205020404" pitchFamily="49" charset="0"/>
+              </a:rPr>
+              <a:t>	$show = Student::create($</a:t>
+            </a:r>
+            <a:r>
+              <a:rPr lang="en-MY" sz="2200" b="1" dirty="0" err="1">
+                <a:latin typeface="Courier New" panose="02070309020205020404" pitchFamily="49" charset="0"/>
+                <a:cs typeface="Courier New" panose="02070309020205020404" pitchFamily="49" charset="0"/>
+              </a:rPr>
+              <a:t>validatedData</a:t>
+            </a:r>
+            <a:r>
+              <a:rPr lang="en-MY" sz="2200" b="1" dirty="0">
+                <a:latin typeface="Courier New" panose="02070309020205020404" pitchFamily="49" charset="0"/>
+                <a:cs typeface="Courier New" panose="02070309020205020404" pitchFamily="49" charset="0"/>
+              </a:rPr>
+              <a:t>);</a:t>
+            </a:r>
+          </a:p>
+          <a:p>
+            <a:pPr marL="118872" indent="0">
+              <a:buNone/>
+            </a:pPr>
+            <a:endParaRPr lang="en-MY" sz="2200" b="1" dirty="0">
+              <a:latin typeface="Courier New" panose="02070309020205020404" pitchFamily="49" charset="0"/>
+              <a:cs typeface="Courier New" panose="02070309020205020404" pitchFamily="49" charset="0"/>
+            </a:endParaRPr>
+          </a:p>
+          <a:p>
+            <a:pPr marL="118872" indent="0">
+              <a:buNone/>
+            </a:pPr>
+            <a:r>
+              <a:rPr lang="en-MY" sz="2200" b="1" dirty="0">
+                <a:latin typeface="Courier New" panose="02070309020205020404" pitchFamily="49" charset="0"/>
+                <a:cs typeface="Courier New" panose="02070309020205020404" pitchFamily="49" charset="0"/>
+              </a:rPr>
+              <a:t>	return redirect(‘/students')-&gt;with('success’, 		'Data saved’);</a:t>
+            </a:r>
+          </a:p>
+          <a:p>
+            <a:pPr marL="118872" indent="0">
+              <a:buNone/>
+            </a:pPr>
+            <a:r>
+              <a:rPr lang="en-MY" sz="2200" b="1" dirty="0">
                 <a:latin typeface="Courier New" panose="02070309020205020404" pitchFamily="49" charset="0"/>
                 <a:cs typeface="Courier New" panose="02070309020205020404" pitchFamily="49" charset="0"/>
               </a:rPr>
@@ -5607,7 +5615,7 @@
     </p:spTree>
     <p:extLst>
       <p:ext uri="{BB962C8B-B14F-4D97-AF65-F5344CB8AC3E}">
-        <p14:creationId xmlns:p14="http://schemas.microsoft.com/office/powerpoint/2010/main" val="705242079"/>
+        <p14:creationId xmlns:p14="http://schemas.microsoft.com/office/powerpoint/2010/main" val="570503314"/>
       </p:ext>
     </p:extLst>
   </p:cSld>
@@ -5657,7 +5665,7 @@
           <a:p>
             <a:r>
               <a:rPr lang="en-US" dirty="0"/>
-              <a:t>Edit Function</a:t>
+              <a:t>Show Function</a:t>
             </a:r>
           </a:p>
         </p:txBody>
@@ -5687,7 +5695,7 @@
           <a:p>
             <a:r>
               <a:rPr lang="en-MY" dirty="0"/>
-              <a:t>Update the edit function in </a:t>
+              <a:t>Edit the show function in </a:t>
             </a:r>
             <a:r>
               <a:rPr lang="en-MY" b="1" dirty="0" err="1"/>
@@ -5714,7 +5722,7 @@
                 <a:latin typeface="Courier New" panose="02070309020205020404" pitchFamily="49" charset="0"/>
                 <a:cs typeface="Courier New" panose="02070309020205020404" pitchFamily="49" charset="0"/>
               </a:rPr>
-              <a:t>public function edit(Student $student)</a:t>
+              <a:t>public function show(Student $student)</a:t>
             </a:r>
           </a:p>
           <a:p>
@@ -5738,7 +5746,7 @@
                 <a:latin typeface="Courier New" panose="02070309020205020404" pitchFamily="49" charset="0"/>
                 <a:cs typeface="Courier New" panose="02070309020205020404" pitchFamily="49" charset="0"/>
               </a:rPr>
-              <a:t>	return view('edit’, compact(’student'));</a:t>
+              <a:t>	return view('show', compact('student'));</a:t>
             </a:r>
           </a:p>
           <a:p>
@@ -5758,7 +5766,7 @@
     </p:spTree>
     <p:extLst>
       <p:ext uri="{BB962C8B-B14F-4D97-AF65-F5344CB8AC3E}">
-        <p14:creationId xmlns:p14="http://schemas.microsoft.com/office/powerpoint/2010/main" val="193644150"/>
+        <p14:creationId xmlns:p14="http://schemas.microsoft.com/office/powerpoint/2010/main" val="705242079"/>
       </p:ext>
     </p:extLst>
   </p:cSld>
@@ -5808,7 +5816,7 @@
           <a:p>
             <a:r>
               <a:rPr lang="en-US" dirty="0"/>
-              <a:t>Update Function</a:t>
+              <a:t>Edit Function</a:t>
             </a:r>
           </a:p>
         </p:txBody>
@@ -5832,13 +5840,13 @@
         <p:spPr/>
         <p:txBody>
           <a:bodyPr>
-            <a:normAutofit fontScale="85000" lnSpcReduction="10000"/>
+            <a:normAutofit/>
           </a:bodyPr>
           <a:lstStyle/>
           <a:p>
             <a:r>
               <a:rPr lang="en-MY" dirty="0"/>
-              <a:t>Edit the update function in </a:t>
+              <a:t>Update the edit function in </a:t>
             </a:r>
             <a:r>
               <a:rPr lang="en-MY" b="1" dirty="0" err="1"/>
@@ -5861,11 +5869,11 @@
               <a:buNone/>
             </a:pPr>
             <a:r>
-              <a:rPr lang="en-MY" sz="2400" b="1" dirty="0">
-                <a:latin typeface="Courier New" panose="02070309020205020404" pitchFamily="49" charset="0"/>
-                <a:cs typeface="Courier New" panose="02070309020205020404" pitchFamily="49" charset="0"/>
-              </a:rPr>
-              <a:t>public function update(Request $request, Student $student)</a:t>
+              <a:rPr lang="en-MY" sz="2000" b="1" dirty="0">
+                <a:latin typeface="Courier New" panose="02070309020205020404" pitchFamily="49" charset="0"/>
+                <a:cs typeface="Courier New" panose="02070309020205020404" pitchFamily="49" charset="0"/>
+              </a:rPr>
+              <a:t>public function edit(Student $student)</a:t>
             </a:r>
           </a:p>
           <a:p>
@@ -5873,7 +5881,7 @@
               <a:buNone/>
             </a:pPr>
             <a:r>
-              <a:rPr lang="en-MY" sz="2400" b="1" dirty="0">
+              <a:rPr lang="en-MY" sz="2000" b="1" dirty="0">
                 <a:latin typeface="Courier New" panose="02070309020205020404" pitchFamily="49" charset="0"/>
                 <a:cs typeface="Courier New" panose="02070309020205020404" pitchFamily="49" charset="0"/>
               </a:rPr>
@@ -5885,25 +5893,11 @@
               <a:buNone/>
             </a:pPr>
             <a:r>
-              <a:rPr lang="en-MY" sz="2400" b="1" dirty="0">
-                <a:latin typeface="Courier New" panose="02070309020205020404" pitchFamily="49" charset="0"/>
-                <a:cs typeface="Courier New" panose="02070309020205020404" pitchFamily="49" charset="0"/>
-              </a:rPr>
-              <a:t>	$</a:t>
-            </a:r>
-            <a:r>
-              <a:rPr lang="en-MY" sz="2400" b="1" dirty="0" err="1">
-                <a:latin typeface="Courier New" panose="02070309020205020404" pitchFamily="49" charset="0"/>
-                <a:cs typeface="Courier New" panose="02070309020205020404" pitchFamily="49" charset="0"/>
-              </a:rPr>
-              <a:t>validatedData</a:t>
-            </a:r>
-            <a:r>
-              <a:rPr lang="en-MY" sz="2400" b="1" dirty="0">
-                <a:latin typeface="Courier New" panose="02070309020205020404" pitchFamily="49" charset="0"/>
-                <a:cs typeface="Courier New" panose="02070309020205020404" pitchFamily="49" charset="0"/>
-              </a:rPr>
-              <a:t> = $request-&gt;validate([ </a:t>
+              <a:rPr lang="en-MY" sz="2000" b="1" dirty="0">
+                <a:latin typeface="Courier New" panose="02070309020205020404" pitchFamily="49" charset="0"/>
+                <a:cs typeface="Courier New" panose="02070309020205020404" pitchFamily="49" charset="0"/>
+              </a:rPr>
+              <a:t>	return view('edit’, compact(’student'));</a:t>
             </a:r>
           </a:p>
           <a:p>
@@ -5911,123 +5905,11 @@
               <a:buNone/>
             </a:pPr>
             <a:r>
-              <a:rPr lang="en-MY" sz="2400" b="1" dirty="0">
-                <a:latin typeface="Courier New" panose="02070309020205020404" pitchFamily="49" charset="0"/>
-                <a:cs typeface="Courier New" panose="02070309020205020404" pitchFamily="49" charset="0"/>
-              </a:rPr>
-              <a:t>		'name' =&gt; 'required|max:255’,</a:t>
-            </a:r>
-          </a:p>
-          <a:p>
-            <a:pPr marL="118872" indent="0">
-              <a:buNone/>
-            </a:pPr>
-            <a:r>
-              <a:rPr lang="en-MY" sz="2400" b="1" dirty="0">
-                <a:latin typeface="Courier New" panose="02070309020205020404" pitchFamily="49" charset="0"/>
-                <a:cs typeface="Courier New" panose="02070309020205020404" pitchFamily="49" charset="0"/>
-              </a:rPr>
-              <a:t>		'email' =&gt; 'required’, </a:t>
-            </a:r>
-          </a:p>
-          <a:p>
-            <a:pPr marL="118872" indent="0">
-              <a:buNone/>
-            </a:pPr>
-            <a:r>
-              <a:rPr lang="en-MY" sz="2400" b="1" dirty="0">
-                <a:latin typeface="Courier New" panose="02070309020205020404" pitchFamily="49" charset="0"/>
-                <a:cs typeface="Courier New" panose="02070309020205020404" pitchFamily="49" charset="0"/>
-              </a:rPr>
-              <a:t>		‘gender' =&gt; 'required’, </a:t>
-            </a:r>
-          </a:p>
-          <a:p>
-            <a:pPr marL="118872" indent="0">
-              <a:buNone/>
-            </a:pPr>
-            <a:r>
-              <a:rPr lang="en-MY" sz="2400" b="1" dirty="0">
-                <a:latin typeface="Courier New" panose="02070309020205020404" pitchFamily="49" charset="0"/>
-                <a:cs typeface="Courier New" panose="02070309020205020404" pitchFamily="49" charset="0"/>
-              </a:rPr>
-              <a:t>		'age' =&gt; '</a:t>
-            </a:r>
-            <a:r>
-              <a:rPr lang="en-MY" sz="2400" b="1" dirty="0" err="1">
-                <a:latin typeface="Courier New" panose="02070309020205020404" pitchFamily="49" charset="0"/>
-                <a:cs typeface="Courier New" panose="02070309020205020404" pitchFamily="49" charset="0"/>
-              </a:rPr>
-              <a:t>required|numeric</a:t>
-            </a:r>
-            <a:r>
-              <a:rPr lang="en-MY" sz="2400" b="1" dirty="0">
-                <a:latin typeface="Courier New" panose="02070309020205020404" pitchFamily="49" charset="0"/>
-                <a:cs typeface="Courier New" panose="02070309020205020404" pitchFamily="49" charset="0"/>
-              </a:rPr>
-              <a:t>',]); </a:t>
-            </a:r>
-          </a:p>
-          <a:p>
-            <a:pPr marL="118872" indent="0">
-              <a:buNone/>
-            </a:pPr>
-            <a:r>
-              <a:rPr lang="en-MY" sz="2400" b="1" dirty="0">
-                <a:latin typeface="Courier New" panose="02070309020205020404" pitchFamily="49" charset="0"/>
-                <a:cs typeface="Courier New" panose="02070309020205020404" pitchFamily="49" charset="0"/>
-              </a:rPr>
-              <a:t>	$students-&gt;update($</a:t>
-            </a:r>
-            <a:r>
-              <a:rPr lang="en-MY" sz="2400" b="1" dirty="0" err="1">
-                <a:latin typeface="Courier New" panose="02070309020205020404" pitchFamily="49" charset="0"/>
-                <a:cs typeface="Courier New" panose="02070309020205020404" pitchFamily="49" charset="0"/>
-              </a:rPr>
-              <a:t>validatedData</a:t>
-            </a:r>
-            <a:r>
-              <a:rPr lang="en-MY" sz="2400" b="1" dirty="0">
-                <a:latin typeface="Courier New" panose="02070309020205020404" pitchFamily="49" charset="0"/>
-                <a:cs typeface="Courier New" panose="02070309020205020404" pitchFamily="49" charset="0"/>
-              </a:rPr>
-              <a:t>); </a:t>
-            </a:r>
-          </a:p>
-          <a:p>
-            <a:pPr marL="118872" indent="0">
-              <a:buNone/>
-            </a:pPr>
-            <a:r>
-              <a:rPr lang="en-MY" sz="2400" b="1" dirty="0">
-                <a:latin typeface="Courier New" panose="02070309020205020404" pitchFamily="49" charset="0"/>
-                <a:cs typeface="Courier New" panose="02070309020205020404" pitchFamily="49" charset="0"/>
-              </a:rPr>
-              <a:t>	return redirect(‘/students’)</a:t>
-            </a:r>
-          </a:p>
-          <a:p>
-            <a:pPr marL="118872" indent="0">
-              <a:buNone/>
-            </a:pPr>
-            <a:r>
-              <a:rPr lang="en-MY" sz="2400" b="1" dirty="0">
-                <a:latin typeface="Courier New" panose="02070309020205020404" pitchFamily="49" charset="0"/>
-                <a:cs typeface="Courier New" panose="02070309020205020404" pitchFamily="49" charset="0"/>
-              </a:rPr>
-              <a:t>		-&gt;with('success', 'Data updated');       </a:t>
-            </a:r>
-          </a:p>
-          <a:p>
-            <a:pPr marL="118872" indent="0">
-              <a:buNone/>
-            </a:pPr>
-            <a:r>
-              <a:rPr lang="en-MY" sz="2400" b="1" dirty="0">
-                <a:latin typeface="Courier New" panose="02070309020205020404" pitchFamily="49" charset="0"/>
-                <a:cs typeface="Courier New" panose="02070309020205020404" pitchFamily="49" charset="0"/>
-              </a:rPr>
-              <a:t>    }</a:t>
+              <a:rPr lang="en-MY" sz="2000" b="1" dirty="0">
+                <a:latin typeface="Courier New" panose="02070309020205020404" pitchFamily="49" charset="0"/>
+                <a:cs typeface="Courier New" panose="02070309020205020404" pitchFamily="49" charset="0"/>
+              </a:rPr>
+              <a:t>}</a:t>
             </a:r>
           </a:p>
         </p:txBody>
@@ -6035,7 +5917,7 @@
     </p:spTree>
     <p:extLst>
       <p:ext uri="{BB962C8B-B14F-4D97-AF65-F5344CB8AC3E}">
-        <p14:creationId xmlns:p14="http://schemas.microsoft.com/office/powerpoint/2010/main" val="1731454129"/>
+        <p14:creationId xmlns:p14="http://schemas.microsoft.com/office/powerpoint/2010/main" val="193644150"/>
       </p:ext>
     </p:extLst>
   </p:cSld>
@@ -6085,7 +5967,7 @@
           <a:p>
             <a:r>
               <a:rPr lang="en-US" dirty="0"/>
-              <a:t>Destroy Function</a:t>
+              <a:t>Update Function</a:t>
             </a:r>
           </a:p>
         </p:txBody>
@@ -6109,13 +5991,13 @@
         <p:spPr/>
         <p:txBody>
           <a:bodyPr>
-            <a:normAutofit lnSpcReduction="10000"/>
+            <a:normAutofit fontScale="85000" lnSpcReduction="10000"/>
           </a:bodyPr>
           <a:lstStyle/>
           <a:p>
             <a:r>
               <a:rPr lang="en-MY" dirty="0"/>
-              <a:t>Edit the destroy function in </a:t>
+              <a:t>Edit the update function in </a:t>
             </a:r>
             <a:r>
               <a:rPr lang="en-MY" b="1" dirty="0" err="1"/>
@@ -6138,11 +6020,11 @@
               <a:buNone/>
             </a:pPr>
             <a:r>
-              <a:rPr lang="en-MY" sz="2200" b="1" dirty="0">
-                <a:latin typeface="Courier New" panose="02070309020205020404" pitchFamily="49" charset="0"/>
-                <a:cs typeface="Courier New" panose="02070309020205020404" pitchFamily="49" charset="0"/>
-              </a:rPr>
-              <a:t>public function destroy(Student $student)</a:t>
+              <a:rPr lang="en-MY" sz="2400" b="1" dirty="0">
+                <a:latin typeface="Courier New" panose="02070309020205020404" pitchFamily="49" charset="0"/>
+                <a:cs typeface="Courier New" panose="02070309020205020404" pitchFamily="49" charset="0"/>
+              </a:rPr>
+              <a:t>public function update(Request $request, Student $student)</a:t>
             </a:r>
           </a:p>
           <a:p>
@@ -6150,7 +6032,7 @@
               <a:buNone/>
             </a:pPr>
             <a:r>
-              <a:rPr lang="en-MY" sz="2200" b="1" dirty="0">
+              <a:rPr lang="en-MY" sz="2400" b="1" dirty="0">
                 <a:latin typeface="Courier New" panose="02070309020205020404" pitchFamily="49" charset="0"/>
                 <a:cs typeface="Courier New" panose="02070309020205020404" pitchFamily="49" charset="0"/>
               </a:rPr>
@@ -6162,32 +6044,49 @@
               <a:buNone/>
             </a:pPr>
             <a:r>
-              <a:rPr lang="en-MY" sz="2200" b="1" dirty="0">
-                <a:latin typeface="Courier New" panose="02070309020205020404" pitchFamily="49" charset="0"/>
-                <a:cs typeface="Courier New" panose="02070309020205020404" pitchFamily="49" charset="0"/>
-              </a:rPr>
-              <a:t>	$student-&gt;delete();</a:t>
+              <a:rPr lang="en-MY" sz="2400" b="1" dirty="0">
+                <a:latin typeface="Courier New" panose="02070309020205020404" pitchFamily="49" charset="0"/>
+                <a:cs typeface="Courier New" panose="02070309020205020404" pitchFamily="49" charset="0"/>
+              </a:rPr>
+              <a:t>	$</a:t>
+            </a:r>
+            <a:r>
+              <a:rPr lang="en-MY" sz="2400" b="1" dirty="0" err="1">
+                <a:latin typeface="Courier New" panose="02070309020205020404" pitchFamily="49" charset="0"/>
+                <a:cs typeface="Courier New" panose="02070309020205020404" pitchFamily="49" charset="0"/>
+              </a:rPr>
+              <a:t>validatedData</a:t>
+            </a:r>
+            <a:r>
+              <a:rPr lang="en-MY" sz="2400" b="1" dirty="0">
+                <a:latin typeface="Courier New" panose="02070309020205020404" pitchFamily="49" charset="0"/>
+                <a:cs typeface="Courier New" panose="02070309020205020404" pitchFamily="49" charset="0"/>
+              </a:rPr>
+              <a:t> = $request-&gt;validate([ </a:t>
             </a:r>
           </a:p>
           <a:p>
             <a:pPr marL="118872" indent="0">
               <a:buNone/>
             </a:pPr>
-            <a:endParaRPr lang="en-MY" sz="2200" b="1" dirty="0">
-              <a:latin typeface="Courier New" panose="02070309020205020404" pitchFamily="49" charset="0"/>
-              <a:cs typeface="Courier New" panose="02070309020205020404" pitchFamily="49" charset="0"/>
-            </a:endParaRPr>
+            <a:r>
+              <a:rPr lang="en-MY" sz="2400" b="1" dirty="0">
+                <a:latin typeface="Courier New" panose="02070309020205020404" pitchFamily="49" charset="0"/>
+                <a:cs typeface="Courier New" panose="02070309020205020404" pitchFamily="49" charset="0"/>
+              </a:rPr>
+              <a:t>		'name' =&gt; 'required|max:255’,</a:t>
+            </a:r>
           </a:p>
           <a:p>
             <a:pPr marL="118872" indent="0">
               <a:buNone/>
             </a:pPr>
             <a:r>
-              <a:rPr lang="en-MY" sz="2200" b="1" dirty="0">
-                <a:latin typeface="Courier New" panose="02070309020205020404" pitchFamily="49" charset="0"/>
-                <a:cs typeface="Courier New" panose="02070309020205020404" pitchFamily="49" charset="0"/>
-              </a:rPr>
-              <a:t>	return redirect()</a:t>
+              <a:rPr lang="en-MY" sz="2400" b="1" dirty="0">
+                <a:latin typeface="Courier New" panose="02070309020205020404" pitchFamily="49" charset="0"/>
+                <a:cs typeface="Courier New" panose="02070309020205020404" pitchFamily="49" charset="0"/>
+              </a:rPr>
+              <a:t>		'email' =&gt; 'required’, </a:t>
             </a:r>
           </a:p>
           <a:p>
@@ -6195,25 +6094,11 @@
               <a:buNone/>
             </a:pPr>
             <a:r>
-              <a:rPr lang="en-MY" sz="2200" b="1" dirty="0">
-                <a:latin typeface="Courier New" panose="02070309020205020404" pitchFamily="49" charset="0"/>
-                <a:cs typeface="Courier New" panose="02070309020205020404" pitchFamily="49" charset="0"/>
-              </a:rPr>
-              <a:t>		-&gt;route('</a:t>
-            </a:r>
-            <a:r>
-              <a:rPr lang="en-MY" sz="2200" b="1" dirty="0" err="1">
-                <a:latin typeface="Courier New" panose="02070309020205020404" pitchFamily="49" charset="0"/>
-                <a:cs typeface="Courier New" panose="02070309020205020404" pitchFamily="49" charset="0"/>
-              </a:rPr>
-              <a:t>students.index</a:t>
-            </a:r>
-            <a:r>
-              <a:rPr lang="en-MY" sz="2200" b="1" dirty="0">
-                <a:latin typeface="Courier New" panose="02070309020205020404" pitchFamily="49" charset="0"/>
-                <a:cs typeface="Courier New" panose="02070309020205020404" pitchFamily="49" charset="0"/>
-              </a:rPr>
-              <a:t>’)</a:t>
+              <a:rPr lang="en-MY" sz="2400" b="1" dirty="0">
+                <a:latin typeface="Courier New" panose="02070309020205020404" pitchFamily="49" charset="0"/>
+                <a:cs typeface="Courier New" panose="02070309020205020404" pitchFamily="49" charset="0"/>
+              </a:rPr>
+              <a:t>		‘gender' =&gt; 'required’, </a:t>
             </a:r>
           </a:p>
           <a:p>
@@ -6221,11 +6106,25 @@
               <a:buNone/>
             </a:pPr>
             <a:r>
-              <a:rPr lang="en-MY" sz="2200" b="1" dirty="0">
-                <a:latin typeface="Courier New" panose="02070309020205020404" pitchFamily="49" charset="0"/>
-                <a:cs typeface="Courier New" panose="02070309020205020404" pitchFamily="49" charset="0"/>
-              </a:rPr>
-              <a:t>		-&gt;with('success', 'Student Data 			deleted successfully');</a:t>
+              <a:rPr lang="en-MY" sz="2400" b="1" dirty="0">
+                <a:latin typeface="Courier New" panose="02070309020205020404" pitchFamily="49" charset="0"/>
+                <a:cs typeface="Courier New" panose="02070309020205020404" pitchFamily="49" charset="0"/>
+              </a:rPr>
+              <a:t>		'age' =&gt; '</a:t>
+            </a:r>
+            <a:r>
+              <a:rPr lang="en-MY" sz="2400" b="1" dirty="0" err="1">
+                <a:latin typeface="Courier New" panose="02070309020205020404" pitchFamily="49" charset="0"/>
+                <a:cs typeface="Courier New" panose="02070309020205020404" pitchFamily="49" charset="0"/>
+              </a:rPr>
+              <a:t>required|numeric</a:t>
+            </a:r>
+            <a:r>
+              <a:rPr lang="en-MY" sz="2400" b="1" dirty="0">
+                <a:latin typeface="Courier New" panose="02070309020205020404" pitchFamily="49" charset="0"/>
+                <a:cs typeface="Courier New" panose="02070309020205020404" pitchFamily="49" charset="0"/>
+              </a:rPr>
+              <a:t>',]); </a:t>
             </a:r>
           </a:p>
           <a:p>
@@ -6233,11 +6132,61 @@
               <a:buNone/>
             </a:pPr>
             <a:r>
-              <a:rPr lang="en-MY" sz="2200" b="1" dirty="0">
-                <a:latin typeface="Courier New" panose="02070309020205020404" pitchFamily="49" charset="0"/>
-                <a:cs typeface="Courier New" panose="02070309020205020404" pitchFamily="49" charset="0"/>
-              </a:rPr>
-              <a:t>}</a:t>
+              <a:rPr lang="en-MY" sz="2400" b="1" dirty="0">
+                <a:latin typeface="Courier New" panose="02070309020205020404" pitchFamily="49" charset="0"/>
+                <a:cs typeface="Courier New" panose="02070309020205020404" pitchFamily="49" charset="0"/>
+              </a:rPr>
+              <a:t>	$students-&gt;update($</a:t>
+            </a:r>
+            <a:r>
+              <a:rPr lang="en-MY" sz="2400" b="1" dirty="0" err="1">
+                <a:latin typeface="Courier New" panose="02070309020205020404" pitchFamily="49" charset="0"/>
+                <a:cs typeface="Courier New" panose="02070309020205020404" pitchFamily="49" charset="0"/>
+              </a:rPr>
+              <a:t>validatedData</a:t>
+            </a:r>
+            <a:r>
+              <a:rPr lang="en-MY" sz="2400" b="1" dirty="0">
+                <a:latin typeface="Courier New" panose="02070309020205020404" pitchFamily="49" charset="0"/>
+                <a:cs typeface="Courier New" panose="02070309020205020404" pitchFamily="49" charset="0"/>
+              </a:rPr>
+              <a:t>); </a:t>
+            </a:r>
+          </a:p>
+          <a:p>
+            <a:pPr marL="118872" indent="0">
+              <a:buNone/>
+            </a:pPr>
+            <a:r>
+              <a:rPr lang="en-MY" sz="2400" b="1" dirty="0">
+                <a:latin typeface="Courier New" panose="02070309020205020404" pitchFamily="49" charset="0"/>
+                <a:cs typeface="Courier New" panose="02070309020205020404" pitchFamily="49" charset="0"/>
+              </a:rPr>
+              <a:t>	return redirect(‘/students’)</a:t>
+            </a:r>
+          </a:p>
+          <a:p>
+            <a:pPr marL="118872" indent="0">
+              <a:buNone/>
+            </a:pPr>
+            <a:r>
+              <a:rPr lang="en-MY" sz="2400" b="1" dirty="0">
+                <a:latin typeface="Courier New" panose="02070309020205020404" pitchFamily="49" charset="0"/>
+                <a:cs typeface="Courier New" panose="02070309020205020404" pitchFamily="49" charset="0"/>
+              </a:rPr>
+              <a:t>		-&gt;with('success', 'Data updated');       </a:t>
+            </a:r>
+          </a:p>
+          <a:p>
+            <a:pPr marL="118872" indent="0">
+              <a:buNone/>
+            </a:pPr>
+            <a:r>
+              <a:rPr lang="en-MY" sz="2400" b="1" dirty="0">
+                <a:latin typeface="Courier New" panose="02070309020205020404" pitchFamily="49" charset="0"/>
+                <a:cs typeface="Courier New" panose="02070309020205020404" pitchFamily="49" charset="0"/>
+              </a:rPr>
+              <a:t>    }</a:t>
             </a:r>
           </a:p>
         </p:txBody>
@@ -6245,7 +6194,7 @@
     </p:spTree>
     <p:extLst>
       <p:ext uri="{BB962C8B-B14F-4D97-AF65-F5344CB8AC3E}">
-        <p14:creationId xmlns:p14="http://schemas.microsoft.com/office/powerpoint/2010/main" val="764792150"/>
+        <p14:creationId xmlns:p14="http://schemas.microsoft.com/office/powerpoint/2010/main" val="1731454129"/>
       </p:ext>
     </p:extLst>
   </p:cSld>
@@ -6295,7 +6244,7 @@
           <a:p>
             <a:r>
               <a:rPr lang="en-US" dirty="0"/>
-              <a:t>Views</a:t>
+              <a:t>Destroy Function</a:t>
             </a:r>
           </a:p>
         </p:txBody>
@@ -6319,19 +6268,135 @@
         <p:spPr/>
         <p:txBody>
           <a:bodyPr>
-            <a:normAutofit/>
+            <a:normAutofit lnSpcReduction="10000"/>
           </a:bodyPr>
           <a:lstStyle/>
           <a:p>
             <a:r>
               <a:rPr lang="en-MY" dirty="0"/>
-              <a:t>Create blades files for display HTML output in the browser.</a:t>
-            </a:r>
-          </a:p>
-          <a:p>
+              <a:t>Edit the destroy function in </a:t>
+            </a:r>
+            <a:r>
+              <a:rPr lang="en-MY" b="1" dirty="0" err="1"/>
+              <a:t>StudentController.php</a:t>
+            </a:r>
+            <a:r>
+              <a:rPr lang="en-MY" b="1" dirty="0"/>
+              <a:t> </a:t>
+            </a:r>
             <a:r>
               <a:rPr lang="en-MY" dirty="0"/>
-              <a:t>Blades files has been stored under resources/views directory.</a:t>
+              <a:t>file under app/Http/Controllers directory</a:t>
+            </a:r>
+          </a:p>
+          <a:p>
+            <a:endParaRPr lang="en-MY" dirty="0"/>
+          </a:p>
+          <a:p>
+            <a:pPr marL="118872" indent="0">
+              <a:buNone/>
+            </a:pPr>
+            <a:r>
+              <a:rPr lang="en-MY" sz="2200" b="1" dirty="0">
+                <a:latin typeface="Courier New" panose="02070309020205020404" pitchFamily="49" charset="0"/>
+                <a:cs typeface="Courier New" panose="02070309020205020404" pitchFamily="49" charset="0"/>
+              </a:rPr>
+              <a:t>public function destroy(Student $student)</a:t>
+            </a:r>
+          </a:p>
+          <a:p>
+            <a:pPr marL="118872" indent="0">
+              <a:buNone/>
+            </a:pPr>
+            <a:r>
+              <a:rPr lang="en-MY" sz="2200" b="1" dirty="0">
+                <a:latin typeface="Courier New" panose="02070309020205020404" pitchFamily="49" charset="0"/>
+                <a:cs typeface="Courier New" panose="02070309020205020404" pitchFamily="49" charset="0"/>
+              </a:rPr>
+              <a:t>{</a:t>
+            </a:r>
+          </a:p>
+          <a:p>
+            <a:pPr marL="118872" indent="0">
+              <a:buNone/>
+            </a:pPr>
+            <a:r>
+              <a:rPr lang="en-MY" sz="2200" b="1" dirty="0">
+                <a:latin typeface="Courier New" panose="02070309020205020404" pitchFamily="49" charset="0"/>
+                <a:cs typeface="Courier New" panose="02070309020205020404" pitchFamily="49" charset="0"/>
+              </a:rPr>
+              <a:t>	$student-&gt;delete();</a:t>
+            </a:r>
+          </a:p>
+          <a:p>
+            <a:pPr marL="118872" indent="0">
+              <a:buNone/>
+            </a:pPr>
+            <a:endParaRPr lang="en-MY" sz="2200" b="1" dirty="0">
+              <a:latin typeface="Courier New" panose="02070309020205020404" pitchFamily="49" charset="0"/>
+              <a:cs typeface="Courier New" panose="02070309020205020404" pitchFamily="49" charset="0"/>
+            </a:endParaRPr>
+          </a:p>
+          <a:p>
+            <a:pPr marL="118872" indent="0">
+              <a:buNone/>
+            </a:pPr>
+            <a:r>
+              <a:rPr lang="en-MY" sz="2200" b="1" dirty="0">
+                <a:latin typeface="Courier New" panose="02070309020205020404" pitchFamily="49" charset="0"/>
+                <a:cs typeface="Courier New" panose="02070309020205020404" pitchFamily="49" charset="0"/>
+              </a:rPr>
+              <a:t>	return redirect()</a:t>
+            </a:r>
+          </a:p>
+          <a:p>
+            <a:pPr marL="118872" indent="0">
+              <a:buNone/>
+            </a:pPr>
+            <a:r>
+              <a:rPr lang="en-MY" sz="2200" b="1" dirty="0">
+                <a:latin typeface="Courier New" panose="02070309020205020404" pitchFamily="49" charset="0"/>
+                <a:cs typeface="Courier New" panose="02070309020205020404" pitchFamily="49" charset="0"/>
+              </a:rPr>
+              <a:t>		-&gt;route('</a:t>
+            </a:r>
+            <a:r>
+              <a:rPr lang="en-MY" sz="2200" b="1" dirty="0" err="1">
+                <a:latin typeface="Courier New" panose="02070309020205020404" pitchFamily="49" charset="0"/>
+                <a:cs typeface="Courier New" panose="02070309020205020404" pitchFamily="49" charset="0"/>
+              </a:rPr>
+              <a:t>students.index</a:t>
+            </a:r>
+            <a:r>
+              <a:rPr lang="en-MY" sz="2200" b="1" dirty="0">
+                <a:latin typeface="Courier New" panose="02070309020205020404" pitchFamily="49" charset="0"/>
+                <a:cs typeface="Courier New" panose="02070309020205020404" pitchFamily="49" charset="0"/>
+              </a:rPr>
+              <a:t>’)</a:t>
+            </a:r>
+          </a:p>
+          <a:p>
+            <a:pPr marL="118872" indent="0">
+              <a:buNone/>
+            </a:pPr>
+            <a:r>
+              <a:rPr lang="en-MY" sz="2200" b="1" dirty="0">
+                <a:latin typeface="Courier New" panose="02070309020205020404" pitchFamily="49" charset="0"/>
+                <a:cs typeface="Courier New" panose="02070309020205020404" pitchFamily="49" charset="0"/>
+              </a:rPr>
+              <a:t>		-&gt;with('success', 'Student Data 			deleted successfully');</a:t>
+            </a:r>
+          </a:p>
+          <a:p>
+            <a:pPr marL="118872" indent="0">
+              <a:buNone/>
+            </a:pPr>
+            <a:r>
+              <a:rPr lang="en-MY" sz="2200" b="1" dirty="0">
+                <a:latin typeface="Courier New" panose="02070309020205020404" pitchFamily="49" charset="0"/>
+                <a:cs typeface="Courier New" panose="02070309020205020404" pitchFamily="49" charset="0"/>
+              </a:rPr>
+              <a:t>}</a:t>
             </a:r>
           </a:p>
         </p:txBody>
@@ -6339,7 +6404,7 @@
     </p:spTree>
     <p:extLst>
       <p:ext uri="{BB962C8B-B14F-4D97-AF65-F5344CB8AC3E}">
-        <p14:creationId xmlns:p14="http://schemas.microsoft.com/office/powerpoint/2010/main" val="1361865788"/>
+        <p14:creationId xmlns:p14="http://schemas.microsoft.com/office/powerpoint/2010/main" val="764792150"/>
       </p:ext>
     </p:extLst>
   </p:cSld>
@@ -6501,7 +6566,7 @@
           <p:cNvPr id="2" name="Title 1">
             <a:extLst>
               <a:ext uri="{FF2B5EF4-FFF2-40B4-BE49-F238E27FC236}">
-                <a16:creationId xmlns:a16="http://schemas.microsoft.com/office/drawing/2014/main" id="{EE6E9AA7-AF98-C24F-B218-2EC97451F213}"/>
+                <a16:creationId xmlns:a16="http://schemas.microsoft.com/office/drawing/2014/main" id="{D8CD56E7-77F5-7741-BFEE-03AD6EC78628}"/>
               </a:ext>
             </a:extLst>
           </p:cNvPr>
@@ -6519,7 +6584,7 @@
           <a:p>
             <a:r>
               <a:rPr lang="en-US" dirty="0"/>
-              <a:t>Views Blade</a:t>
+              <a:t>Views</a:t>
             </a:r>
           </a:p>
         </p:txBody>
@@ -6529,7 +6594,7 @@
           <p:cNvPr id="3" name="Content Placeholder 2">
             <a:extLst>
               <a:ext uri="{FF2B5EF4-FFF2-40B4-BE49-F238E27FC236}">
-                <a16:creationId xmlns:a16="http://schemas.microsoft.com/office/drawing/2014/main" id="{9E0E053D-2431-514D-A990-06B94BA4EBDD}"/>
+                <a16:creationId xmlns:a16="http://schemas.microsoft.com/office/drawing/2014/main" id="{BC4B7883-0E04-0143-BAEA-C48D637EFDFB}"/>
               </a:ext>
             </a:extLst>
           </p:cNvPr>
@@ -6547,65 +6612,15 @@
           </a:bodyPr>
           <a:lstStyle/>
           <a:p>
-            <a:pPr fontAlgn="base"/>
             <a:r>
               <a:rPr lang="en-MY" dirty="0"/>
-              <a:t>Create following views blades files.</a:t>
-            </a:r>
-          </a:p>
-          <a:p>
-            <a:pPr lvl="1" fontAlgn="base"/>
-            <a:r>
-              <a:rPr lang="en-MY" b="1" dirty="0" err="1"/>
-              <a:t>master.blade.php</a:t>
-            </a:r>
+              <a:t>Create blades files for display HTML output in the browser.</a:t>
+            </a:r>
+          </a:p>
+          <a:p>
             <a:r>
               <a:rPr lang="en-MY" dirty="0"/>
-              <a:t> - This is master template file.</a:t>
-            </a:r>
-          </a:p>
-          <a:p>
-            <a:pPr lvl="1" fontAlgn="base"/>
-            <a:r>
-              <a:rPr lang="en-MY" b="1" dirty="0" err="1"/>
-              <a:t>index.blade.php</a:t>
-            </a:r>
-            <a:r>
-              <a:rPr lang="en-MY" dirty="0"/>
-              <a:t> - This file we will used for display MySQL table data on the web page in HTML table format with pagination link.</a:t>
-            </a:r>
-          </a:p>
-          <a:p>
-            <a:pPr lvl="1" fontAlgn="base"/>
-            <a:r>
-              <a:rPr lang="en-MY" b="1" dirty="0" err="1"/>
-              <a:t>create.blade.php</a:t>
-            </a:r>
-            <a:r>
-              <a:rPr lang="en-MY" dirty="0"/>
-              <a:t> - This file has been used for load Create Student form on the web page.</a:t>
-            </a:r>
-          </a:p>
-          <a:p>
-            <a:pPr lvl="1" fontAlgn="base"/>
-            <a:r>
-              <a:rPr lang="en-MY" b="1" dirty="0" err="1"/>
-              <a:t>show.blade.php</a:t>
-            </a:r>
-            <a:r>
-              <a:rPr lang="en-MY" dirty="0"/>
-              <a:t> - This file has been used for display single student data on the web page.</a:t>
-            </a:r>
-          </a:p>
-          <a:p>
-            <a:pPr lvl="1" fontAlgn="base"/>
-            <a:r>
-              <a:rPr lang="en-MY" b="1" dirty="0" err="1"/>
-              <a:t>edit.blade.php</a:t>
-            </a:r>
-            <a:r>
-              <a:rPr lang="en-MY" dirty="0"/>
-              <a:t> - This file has been used for load student edit form in the browser.</a:t>
+              <a:t>Blades files has been stored under resources/views directory.</a:t>
             </a:r>
           </a:p>
         </p:txBody>
@@ -6613,7 +6628,7 @@
     </p:spTree>
     <p:extLst>
       <p:ext uri="{BB962C8B-B14F-4D97-AF65-F5344CB8AC3E}">
-        <p14:creationId xmlns:p14="http://schemas.microsoft.com/office/powerpoint/2010/main" val="1461380728"/>
+        <p14:creationId xmlns:p14="http://schemas.microsoft.com/office/powerpoint/2010/main" val="1361865788"/>
       </p:ext>
     </p:extLst>
   </p:cSld>
@@ -6645,7 +6660,7 @@
           <p:cNvPr id="2" name="Title 1">
             <a:extLst>
               <a:ext uri="{FF2B5EF4-FFF2-40B4-BE49-F238E27FC236}">
-                <a16:creationId xmlns:a16="http://schemas.microsoft.com/office/drawing/2014/main" id="{91014737-AAE7-0C43-8257-A28E6E660D00}"/>
+                <a16:creationId xmlns:a16="http://schemas.microsoft.com/office/drawing/2014/main" id="{EE6E9AA7-AF98-C24F-B218-2EC97451F213}"/>
               </a:ext>
             </a:extLst>
           </p:cNvPr>
@@ -6663,7 +6678,7 @@
           <a:p>
             <a:r>
               <a:rPr lang="en-US" dirty="0"/>
-              <a:t>Route</a:t>
+              <a:t>Views Blade</a:t>
             </a:r>
           </a:p>
         </p:txBody>
@@ -6673,7 +6688,7 @@
           <p:cNvPr id="3" name="Content Placeholder 2">
             <a:extLst>
               <a:ext uri="{FF2B5EF4-FFF2-40B4-BE49-F238E27FC236}">
-                <a16:creationId xmlns:a16="http://schemas.microsoft.com/office/drawing/2014/main" id="{4F3CA370-A6D7-F34D-8B22-598C22C6A329}"/>
+                <a16:creationId xmlns:a16="http://schemas.microsoft.com/office/drawing/2014/main" id="{9E0E053D-2431-514D-A990-06B94BA4EBDD}"/>
               </a:ext>
             </a:extLst>
           </p:cNvPr>
@@ -6691,69 +6706,73 @@
           </a:bodyPr>
           <a:lstStyle/>
           <a:p>
+            <a:pPr fontAlgn="base"/>
             <a:r>
               <a:rPr lang="en-MY" dirty="0"/>
-              <a:t>Add resource route to routes/</a:t>
-            </a:r>
-            <a:r>
-              <a:rPr lang="en-MY" dirty="0" err="1"/>
-              <a:t>web.php</a:t>
+              <a:t>Create following views blades files.</a:t>
+            </a:r>
+          </a:p>
+          <a:p>
+            <a:pPr lvl="1" fontAlgn="base"/>
+            <a:r>
+              <a:rPr lang="en-MY" b="1" dirty="0" err="1"/>
+              <a:t>master.blade.php</a:t>
             </a:r>
             <a:r>
               <a:rPr lang="en-MY" dirty="0"/>
-              <a:t> file </a:t>
-            </a:r>
-          </a:p>
-          <a:p>
-            <a:endParaRPr lang="en-MY" dirty="0"/>
-          </a:p>
-          <a:p>
-            <a:pPr marL="118872" indent="0">
-              <a:buNone/>
-            </a:pPr>
-            <a:r>
-              <a:rPr lang="en-MY" sz="2000" b="1" dirty="0">
-                <a:latin typeface="Courier New" panose="02070309020205020404" pitchFamily="49" charset="0"/>
-                <a:cs typeface="Courier New" panose="02070309020205020404" pitchFamily="49" charset="0"/>
-              </a:rPr>
-              <a:t>Route::resource('students’, 	'App\Http\Controllers\</a:t>
-            </a:r>
-            <a:r>
-              <a:rPr lang="en-MY" sz="2000" b="1" dirty="0" err="1">
-                <a:latin typeface="Courier New" panose="02070309020205020404" pitchFamily="49" charset="0"/>
-                <a:cs typeface="Courier New" panose="02070309020205020404" pitchFamily="49" charset="0"/>
-              </a:rPr>
-              <a:t>StudentController</a:t>
-            </a:r>
-            <a:r>
-              <a:rPr lang="en-MY" sz="2000" b="1" dirty="0">
-                <a:latin typeface="Courier New" panose="02070309020205020404" pitchFamily="49" charset="0"/>
-                <a:cs typeface="Courier New" panose="02070309020205020404" pitchFamily="49" charset="0"/>
-              </a:rPr>
-              <a:t>');</a:t>
-            </a:r>
-          </a:p>
-          <a:p>
-            <a:pPr marL="118872" indent="0">
-              <a:buNone/>
-            </a:pPr>
-            <a:br>
-              <a:rPr lang="en-MY" sz="2000" b="1" dirty="0">
-                <a:latin typeface="Courier New" panose="02070309020205020404" pitchFamily="49" charset="0"/>
-                <a:cs typeface="Courier New" panose="02070309020205020404" pitchFamily="49" charset="0"/>
-              </a:rPr>
-            </a:br>
-            <a:endParaRPr lang="en-MY" sz="2000" b="1" dirty="0">
-              <a:latin typeface="Courier New" panose="02070309020205020404" pitchFamily="49" charset="0"/>
-              <a:cs typeface="Courier New" panose="02070309020205020404" pitchFamily="49" charset="0"/>
-            </a:endParaRPr>
+              <a:t> - This is master template file.</a:t>
+            </a:r>
+          </a:p>
+          <a:p>
+            <a:pPr lvl="1" fontAlgn="base"/>
+            <a:r>
+              <a:rPr lang="en-MY" b="1" dirty="0" err="1"/>
+              <a:t>index.blade.php</a:t>
+            </a:r>
+            <a:r>
+              <a:rPr lang="en-MY" dirty="0"/>
+              <a:t> - This file we will used for display MySQL table data on the web page in HTML table format with pagination link.</a:t>
+            </a:r>
+          </a:p>
+          <a:p>
+            <a:pPr lvl="1" fontAlgn="base"/>
+            <a:r>
+              <a:rPr lang="en-MY" b="1" dirty="0" err="1"/>
+              <a:t>create.blade.php</a:t>
+            </a:r>
+            <a:r>
+              <a:rPr lang="en-MY" dirty="0"/>
+              <a:t> - This file has been used for load Create Student form on the web page.</a:t>
+            </a:r>
+          </a:p>
+          <a:p>
+            <a:pPr lvl="1" fontAlgn="base"/>
+            <a:r>
+              <a:rPr lang="en-MY" b="1" dirty="0" err="1"/>
+              <a:t>show.blade.php</a:t>
+            </a:r>
+            <a:r>
+              <a:rPr lang="en-MY" dirty="0"/>
+              <a:t> - This file has been used for display single student data on the web page.</a:t>
+            </a:r>
+          </a:p>
+          <a:p>
+            <a:pPr lvl="1" fontAlgn="base"/>
+            <a:r>
+              <a:rPr lang="en-MY" b="1" dirty="0" err="1"/>
+              <a:t>edit.blade.php</a:t>
+            </a:r>
+            <a:r>
+              <a:rPr lang="en-MY" dirty="0"/>
+              <a:t> - This file has been used for load student edit form in the browser.</a:t>
+            </a:r>
           </a:p>
         </p:txBody>
       </p:sp>
     </p:spTree>
     <p:extLst>
       <p:ext uri="{BB962C8B-B14F-4D97-AF65-F5344CB8AC3E}">
-        <p14:creationId xmlns:p14="http://schemas.microsoft.com/office/powerpoint/2010/main" val="3533579548"/>
+        <p14:creationId xmlns:p14="http://schemas.microsoft.com/office/powerpoint/2010/main" val="1461380728"/>
       </p:ext>
     </p:extLst>
   </p:cSld>
@@ -6785,6 +6804,146 @@
           <p:cNvPr id="2" name="Title 1">
             <a:extLst>
               <a:ext uri="{FF2B5EF4-FFF2-40B4-BE49-F238E27FC236}">
+                <a16:creationId xmlns:a16="http://schemas.microsoft.com/office/drawing/2014/main" id="{91014737-AAE7-0C43-8257-A28E6E660D00}"/>
+              </a:ext>
+            </a:extLst>
+          </p:cNvPr>
+          <p:cNvSpPr>
+            <a:spLocks noGrp="1"/>
+          </p:cNvSpPr>
+          <p:nvPr>
+            <p:ph type="title"/>
+          </p:nvPr>
+        </p:nvSpPr>
+        <p:spPr/>
+        <p:txBody>
+          <a:bodyPr/>
+          <a:lstStyle/>
+          <a:p>
+            <a:r>
+              <a:rPr lang="en-US" dirty="0"/>
+              <a:t>Route</a:t>
+            </a:r>
+          </a:p>
+        </p:txBody>
+      </p:sp>
+      <p:sp>
+        <p:nvSpPr>
+          <p:cNvPr id="3" name="Content Placeholder 2">
+            <a:extLst>
+              <a:ext uri="{FF2B5EF4-FFF2-40B4-BE49-F238E27FC236}">
+                <a16:creationId xmlns:a16="http://schemas.microsoft.com/office/drawing/2014/main" id="{4F3CA370-A6D7-F34D-8B22-598C22C6A329}"/>
+              </a:ext>
+            </a:extLst>
+          </p:cNvPr>
+          <p:cNvSpPr>
+            <a:spLocks noGrp="1"/>
+          </p:cNvSpPr>
+          <p:nvPr>
+            <p:ph idx="1"/>
+          </p:nvPr>
+        </p:nvSpPr>
+        <p:spPr/>
+        <p:txBody>
+          <a:bodyPr>
+            <a:normAutofit/>
+          </a:bodyPr>
+          <a:lstStyle/>
+          <a:p>
+            <a:r>
+              <a:rPr lang="en-MY" dirty="0"/>
+              <a:t>Add resource route to routes/</a:t>
+            </a:r>
+            <a:r>
+              <a:rPr lang="en-MY" dirty="0" err="1"/>
+              <a:t>web.php</a:t>
+            </a:r>
+            <a:r>
+              <a:rPr lang="en-MY" dirty="0"/>
+              <a:t> file </a:t>
+            </a:r>
+          </a:p>
+          <a:p>
+            <a:endParaRPr lang="en-MY" dirty="0"/>
+          </a:p>
+          <a:p>
+            <a:pPr marL="118872" indent="0">
+              <a:buNone/>
+            </a:pPr>
+            <a:r>
+              <a:rPr lang="en-MY" sz="2000" b="1" dirty="0">
+                <a:latin typeface="Courier New" panose="02070309020205020404" pitchFamily="49" charset="0"/>
+                <a:cs typeface="Courier New" panose="02070309020205020404" pitchFamily="49" charset="0"/>
+              </a:rPr>
+              <a:t>Route::resource('students’, 	'App\Http\Controllers\</a:t>
+            </a:r>
+            <a:r>
+              <a:rPr lang="en-MY" sz="2000" b="1" dirty="0" err="1">
+                <a:latin typeface="Courier New" panose="02070309020205020404" pitchFamily="49" charset="0"/>
+                <a:cs typeface="Courier New" panose="02070309020205020404" pitchFamily="49" charset="0"/>
+              </a:rPr>
+              <a:t>StudentController</a:t>
+            </a:r>
+            <a:r>
+              <a:rPr lang="en-MY" sz="2000" b="1" dirty="0">
+                <a:latin typeface="Courier New" panose="02070309020205020404" pitchFamily="49" charset="0"/>
+                <a:cs typeface="Courier New" panose="02070309020205020404" pitchFamily="49" charset="0"/>
+              </a:rPr>
+              <a:t>');</a:t>
+            </a:r>
+          </a:p>
+          <a:p>
+            <a:pPr marL="118872" indent="0">
+              <a:buNone/>
+            </a:pPr>
+            <a:br>
+              <a:rPr lang="en-MY" sz="2000" b="1" dirty="0">
+                <a:latin typeface="Courier New" panose="02070309020205020404" pitchFamily="49" charset="0"/>
+                <a:cs typeface="Courier New" panose="02070309020205020404" pitchFamily="49" charset="0"/>
+              </a:rPr>
+            </a:br>
+            <a:endParaRPr lang="en-MY" sz="2000" b="1" dirty="0">
+              <a:latin typeface="Courier New" panose="02070309020205020404" pitchFamily="49" charset="0"/>
+              <a:cs typeface="Courier New" panose="02070309020205020404" pitchFamily="49" charset="0"/>
+            </a:endParaRPr>
+          </a:p>
+        </p:txBody>
+      </p:sp>
+    </p:spTree>
+    <p:extLst>
+      <p:ext uri="{BB962C8B-B14F-4D97-AF65-F5344CB8AC3E}">
+        <p14:creationId xmlns:p14="http://schemas.microsoft.com/office/powerpoint/2010/main" val="3533579548"/>
+      </p:ext>
+    </p:extLst>
+  </p:cSld>
+  <p:clrMapOvr>
+    <a:masterClrMapping/>
+  </p:clrMapOvr>
+</p:sld>
+</file>
+
+<file path=ppt/slides/slide23.xml><?xml version="1.0" encoding="utf-8"?>
+<p:sld xmlns:a="http://schemas.openxmlformats.org/drawingml/2006/main" xmlns:r="http://schemas.openxmlformats.org/officeDocument/2006/relationships" xmlns:p="http://schemas.openxmlformats.org/presentationml/2006/main">
+  <p:cSld>
+    <p:spTree>
+      <p:nvGrpSpPr>
+        <p:cNvPr id="1" name=""/>
+        <p:cNvGrpSpPr/>
+        <p:nvPr/>
+      </p:nvGrpSpPr>
+      <p:grpSpPr>
+        <a:xfrm>
+          <a:off x="0" y="0"/>
+          <a:ext cx="0" cy="0"/>
+          <a:chOff x="0" y="0"/>
+          <a:chExt cx="0" cy="0"/>
+        </a:xfrm>
+      </p:grpSpPr>
+      <p:sp>
+        <p:nvSpPr>
+          <p:cNvPr id="2" name="Title 1">
+            <a:extLst>
+              <a:ext uri="{FF2B5EF4-FFF2-40B4-BE49-F238E27FC236}">
                 <a16:creationId xmlns:a16="http://schemas.microsoft.com/office/drawing/2014/main" id="{48F6ED9C-3032-5C47-8931-733E72B055C2}"/>
               </a:ext>
             </a:extLst>
@@ -6899,7 +7058,7 @@
 </p:sld>
 </file>
 
-<file path=ppt/slides/slide23.xml><?xml version="1.0" encoding="utf-8"?>
+<file path=ppt/slides/slide24.xml><?xml version="1.0" encoding="utf-8"?>
 <p:sld xmlns:a="http://schemas.openxmlformats.org/drawingml/2006/main" xmlns:r="http://schemas.openxmlformats.org/officeDocument/2006/relationships" xmlns:p="http://schemas.openxmlformats.org/presentationml/2006/main">
   <p:cSld>
     <p:spTree>

</xml_diff>